<commit_message>
Updated website with news section
</commit_message>
<xml_diff>
--- a/src/img/logo_docs/V2/logo.pptx
+++ b/src/img/logo_docs/V2/logo.pptx
@@ -193,7 +193,7 @@
           <a:p>
             <a:fld id="{454B7729-2C4C-4744-8D72-CD56E53E728A}" type="datetimeFigureOut">
               <a:rPr lang="en-US" smtClean="0"/>
-              <a:t>7/1/17</a:t>
+              <a:t>3/18/18</a:t>
             </a:fld>
             <a:endParaRPr lang="en-US"/>
           </a:p>
@@ -726,7 +726,7 @@
           <a:p>
             <a:fld id="{7FDC75B5-0F21-CC40-9F57-0B9DA2A98326}" type="datetimeFigureOut">
               <a:rPr lang="en-US" smtClean="0"/>
-              <a:t>7/1/17</a:t>
+              <a:t>3/18/18</a:t>
             </a:fld>
             <a:endParaRPr lang="en-US"/>
           </a:p>
@@ -896,7 +896,7 @@
           <a:p>
             <a:fld id="{7FDC75B5-0F21-CC40-9F57-0B9DA2A98326}" type="datetimeFigureOut">
               <a:rPr lang="en-US" smtClean="0"/>
-              <a:t>7/1/17</a:t>
+              <a:t>3/18/18</a:t>
             </a:fld>
             <a:endParaRPr lang="en-US"/>
           </a:p>
@@ -1076,7 +1076,7 @@
           <a:p>
             <a:fld id="{7FDC75B5-0F21-CC40-9F57-0B9DA2A98326}" type="datetimeFigureOut">
               <a:rPr lang="en-US" smtClean="0"/>
-              <a:t>7/1/17</a:t>
+              <a:t>3/18/18</a:t>
             </a:fld>
             <a:endParaRPr lang="en-US"/>
           </a:p>
@@ -1246,7 +1246,7 @@
           <a:p>
             <a:fld id="{7FDC75B5-0F21-CC40-9F57-0B9DA2A98326}" type="datetimeFigureOut">
               <a:rPr lang="en-US" smtClean="0"/>
-              <a:t>7/1/17</a:t>
+              <a:t>3/18/18</a:t>
             </a:fld>
             <a:endParaRPr lang="en-US"/>
           </a:p>
@@ -1492,7 +1492,7 @@
           <a:p>
             <a:fld id="{7FDC75B5-0F21-CC40-9F57-0B9DA2A98326}" type="datetimeFigureOut">
               <a:rPr lang="en-US" smtClean="0"/>
-              <a:t>7/1/17</a:t>
+              <a:t>3/18/18</a:t>
             </a:fld>
             <a:endParaRPr lang="en-US"/>
           </a:p>
@@ -1780,7 +1780,7 @@
           <a:p>
             <a:fld id="{7FDC75B5-0F21-CC40-9F57-0B9DA2A98326}" type="datetimeFigureOut">
               <a:rPr lang="en-US" smtClean="0"/>
-              <a:t>7/1/17</a:t>
+              <a:t>3/18/18</a:t>
             </a:fld>
             <a:endParaRPr lang="en-US"/>
           </a:p>
@@ -2202,7 +2202,7 @@
           <a:p>
             <a:fld id="{7FDC75B5-0F21-CC40-9F57-0B9DA2A98326}" type="datetimeFigureOut">
               <a:rPr lang="en-US" smtClean="0"/>
-              <a:t>7/1/17</a:t>
+              <a:t>3/18/18</a:t>
             </a:fld>
             <a:endParaRPr lang="en-US"/>
           </a:p>
@@ -2320,7 +2320,7 @@
           <a:p>
             <a:fld id="{7FDC75B5-0F21-CC40-9F57-0B9DA2A98326}" type="datetimeFigureOut">
               <a:rPr lang="en-US" smtClean="0"/>
-              <a:t>7/1/17</a:t>
+              <a:t>3/18/18</a:t>
             </a:fld>
             <a:endParaRPr lang="en-US"/>
           </a:p>
@@ -2415,7 +2415,7 @@
           <a:p>
             <a:fld id="{7FDC75B5-0F21-CC40-9F57-0B9DA2A98326}" type="datetimeFigureOut">
               <a:rPr lang="en-US" smtClean="0"/>
-              <a:t>7/1/17</a:t>
+              <a:t>3/18/18</a:t>
             </a:fld>
             <a:endParaRPr lang="en-US"/>
           </a:p>
@@ -2692,7 +2692,7 @@
           <a:p>
             <a:fld id="{7FDC75B5-0F21-CC40-9F57-0B9DA2A98326}" type="datetimeFigureOut">
               <a:rPr lang="en-US" smtClean="0"/>
-              <a:t>7/1/17</a:t>
+              <a:t>3/18/18</a:t>
             </a:fld>
             <a:endParaRPr lang="en-US"/>
           </a:p>
@@ -2945,7 +2945,7 @@
           <a:p>
             <a:fld id="{7FDC75B5-0F21-CC40-9F57-0B9DA2A98326}" type="datetimeFigureOut">
               <a:rPr lang="en-US" smtClean="0"/>
-              <a:t>7/1/17</a:t>
+              <a:t>3/18/18</a:t>
             </a:fld>
             <a:endParaRPr lang="en-US"/>
           </a:p>
@@ -3158,7 +3158,7 @@
           <a:p>
             <a:fld id="{7FDC75B5-0F21-CC40-9F57-0B9DA2A98326}" type="datetimeFigureOut">
               <a:rPr lang="en-US" smtClean="0"/>
-              <a:t>7/1/17</a:t>
+              <a:t>3/18/18</a:t>
             </a:fld>
             <a:endParaRPr lang="en-US"/>
           </a:p>

</xml_diff>